<commit_message>
test modif fichier ppt
</commit_message>
<xml_diff>
--- a/docs/Soutenance/PréSoutenance 0511.pptx
+++ b/docs/Soutenance/PréSoutenance 0511.pptx
@@ -3118,7 +3118,11 @@
           <a:bodyPr/>
           <a:lstStyle/>
           <a:p>
-            <a:endParaRPr lang="fr-FR"/>
+            <a:r>
+              <a:rPr lang="fr-FR" dirty="0" err="1" smtClean="0"/>
+              <a:t>tretzertze</a:t>
+            </a:r>
+            <a:endParaRPr lang="fr-FR" dirty="0"/>
           </a:p>
         </p:txBody>
       </p:sp>

</xml_diff>